<commit_message>
Update text in workspace setting image
</commit_message>
<xml_diff>
--- a/images/images.pptx
+++ b/images/images.pptx
@@ -254,7 +254,7 @@
           <a:p>
             <a:fld id="{9E2058E3-1A30-4FDD-BA8F-69AE6C39B82F}" type="datetimeFigureOut">
               <a:rPr lang="en-US" smtClean="0"/>
-              <a:t>2022-09-26</a:t>
+              <a:t>2022-09-27</a:t>
             </a:fld>
             <a:endParaRPr lang="en-US"/>
           </a:p>
@@ -424,7 +424,7 @@
           <a:p>
             <a:fld id="{9E2058E3-1A30-4FDD-BA8F-69AE6C39B82F}" type="datetimeFigureOut">
               <a:rPr lang="en-US" smtClean="0"/>
-              <a:t>2022-09-26</a:t>
+              <a:t>2022-09-27</a:t>
             </a:fld>
             <a:endParaRPr lang="en-US"/>
           </a:p>
@@ -604,7 +604,7 @@
           <a:p>
             <a:fld id="{9E2058E3-1A30-4FDD-BA8F-69AE6C39B82F}" type="datetimeFigureOut">
               <a:rPr lang="en-US" smtClean="0"/>
-              <a:t>2022-09-26</a:t>
+              <a:t>2022-09-27</a:t>
             </a:fld>
             <a:endParaRPr lang="en-US"/>
           </a:p>
@@ -774,7 +774,7 @@
           <a:p>
             <a:fld id="{9E2058E3-1A30-4FDD-BA8F-69AE6C39B82F}" type="datetimeFigureOut">
               <a:rPr lang="en-US" smtClean="0"/>
-              <a:t>2022-09-26</a:t>
+              <a:t>2022-09-27</a:t>
             </a:fld>
             <a:endParaRPr lang="en-US"/>
           </a:p>
@@ -1020,7 +1020,7 @@
           <a:p>
             <a:fld id="{9E2058E3-1A30-4FDD-BA8F-69AE6C39B82F}" type="datetimeFigureOut">
               <a:rPr lang="en-US" smtClean="0"/>
-              <a:t>2022-09-26</a:t>
+              <a:t>2022-09-27</a:t>
             </a:fld>
             <a:endParaRPr lang="en-US"/>
           </a:p>
@@ -1252,7 +1252,7 @@
           <a:p>
             <a:fld id="{9E2058E3-1A30-4FDD-BA8F-69AE6C39B82F}" type="datetimeFigureOut">
               <a:rPr lang="en-US" smtClean="0"/>
-              <a:t>2022-09-26</a:t>
+              <a:t>2022-09-27</a:t>
             </a:fld>
             <a:endParaRPr lang="en-US"/>
           </a:p>
@@ -1619,7 +1619,7 @@
           <a:p>
             <a:fld id="{9E2058E3-1A30-4FDD-BA8F-69AE6C39B82F}" type="datetimeFigureOut">
               <a:rPr lang="en-US" smtClean="0"/>
-              <a:t>2022-09-26</a:t>
+              <a:t>2022-09-27</a:t>
             </a:fld>
             <a:endParaRPr lang="en-US"/>
           </a:p>
@@ -1737,7 +1737,7 @@
           <a:p>
             <a:fld id="{9E2058E3-1A30-4FDD-BA8F-69AE6C39B82F}" type="datetimeFigureOut">
               <a:rPr lang="en-US" smtClean="0"/>
-              <a:t>2022-09-26</a:t>
+              <a:t>2022-09-27</a:t>
             </a:fld>
             <a:endParaRPr lang="en-US"/>
           </a:p>
@@ -1832,7 +1832,7 @@
           <a:p>
             <a:fld id="{9E2058E3-1A30-4FDD-BA8F-69AE6C39B82F}" type="datetimeFigureOut">
               <a:rPr lang="en-US" smtClean="0"/>
-              <a:t>2022-09-26</a:t>
+              <a:t>2022-09-27</a:t>
             </a:fld>
             <a:endParaRPr lang="en-US"/>
           </a:p>
@@ -2109,7 +2109,7 @@
           <a:p>
             <a:fld id="{9E2058E3-1A30-4FDD-BA8F-69AE6C39B82F}" type="datetimeFigureOut">
               <a:rPr lang="en-US" smtClean="0"/>
-              <a:t>2022-09-26</a:t>
+              <a:t>2022-09-27</a:t>
             </a:fld>
             <a:endParaRPr lang="en-US"/>
           </a:p>
@@ -2366,7 +2366,7 @@
           <a:p>
             <a:fld id="{9E2058E3-1A30-4FDD-BA8F-69AE6C39B82F}" type="datetimeFigureOut">
               <a:rPr lang="en-US" smtClean="0"/>
-              <a:t>2022-09-26</a:t>
+              <a:t>2022-09-27</a:t>
             </a:fld>
             <a:endParaRPr lang="en-US"/>
           </a:p>
@@ -2579,7 +2579,7 @@
           <a:p>
             <a:fld id="{9E2058E3-1A30-4FDD-BA8F-69AE6C39B82F}" type="datetimeFigureOut">
               <a:rPr lang="en-US" smtClean="0"/>
-              <a:t>2022-09-26</a:t>
+              <a:t>2022-09-27</a:t>
             </a:fld>
             <a:endParaRPr lang="en-US"/>
           </a:p>
@@ -3201,7 +3201,7 @@
                     <a:ea typeface="Cambria" panose="02040503050406030204" pitchFamily="18" charset="0"/>
                     <a:cs typeface="Segoe UI Semibold" panose="020B0702040204020203" pitchFamily="34" charset="0"/>
                   </a:rPr>
-                  <a:t>Decoration rules for matching files</a:t>
+                  <a:t>Decoration rules for the matching files</a:t>
                 </a:r>
               </a:p>
             </p:txBody>
@@ -3268,10 +3268,10 @@
           </p:nvGrpSpPr>
           <p:grpSpPr>
             <a:xfrm>
-              <a:off x="2390776" y="254979"/>
-              <a:ext cx="3067049" cy="542934"/>
-              <a:chOff x="-1762124" y="1824379"/>
-              <a:chExt cx="3067049" cy="542934"/>
+              <a:off x="2390788" y="254979"/>
+              <a:ext cx="3132611" cy="542934"/>
+              <a:chOff x="-1762112" y="1824379"/>
+              <a:chExt cx="3132611" cy="542934"/>
             </a:xfrm>
           </p:grpSpPr>
           <p:cxnSp>
@@ -3292,7 +3292,7 @@
             <p:spPr>
               <a:xfrm rot="10800000" flipV="1">
                 <a:off x="-456238" y="2039822"/>
-                <a:ext cx="418138" cy="318809"/>
+                <a:ext cx="418138" cy="318797"/>
               </a:xfrm>
               <a:prstGeom prst="curvedConnector3">
                 <a:avLst>
@@ -3336,7 +3336,7 @@
             <p:spPr>
               <a:xfrm>
                 <a:off x="-38100" y="1824379"/>
-                <a:ext cx="1343025" cy="430887"/>
+                <a:ext cx="1408599" cy="430887"/>
               </a:xfrm>
               <a:prstGeom prst="rect">
                 <a:avLst/>
@@ -3359,7 +3359,7 @@
                     <a:ea typeface="Cambria" panose="02040503050406030204" pitchFamily="18" charset="0"/>
                     <a:cs typeface="Segoe UI Semibold" panose="020B0702040204020203" pitchFamily="34" charset="0"/>
                   </a:rPr>
-                  <a:t>Glob-like patterns for file selection</a:t>
+                  <a:t>Glob-style patterns to select files</a:t>
                 </a:r>
               </a:p>
             </p:txBody>
@@ -3381,8 +3381,8 @@
             </p:nvCxnSpPr>
             <p:spPr>
               <a:xfrm rot="10800000" flipV="1">
-                <a:off x="-1762124" y="2039823"/>
-                <a:ext cx="1724025" cy="327490"/>
+                <a:off x="-1762112" y="2039823"/>
+                <a:ext cx="1724013" cy="327490"/>
               </a:xfrm>
               <a:prstGeom prst="curvedConnector3">
                 <a:avLst>
@@ -3427,9 +3427,9 @@
           <p:grpSpPr>
             <a:xfrm>
               <a:off x="4886343" y="1477252"/>
-              <a:ext cx="1914507" cy="688815"/>
+              <a:ext cx="2069440" cy="688815"/>
               <a:chOff x="-1716167" y="1862614"/>
-              <a:chExt cx="1914507" cy="688815"/>
+              <a:chExt cx="2069440" cy="688815"/>
             </a:xfrm>
           </p:grpSpPr>
           <p:cxnSp>
@@ -3449,13 +3449,13 @@
             </p:nvCxnSpPr>
             <p:spPr>
               <a:xfrm rot="10800000" flipH="1">
-                <a:off x="-1144685" y="1909288"/>
-                <a:ext cx="266718" cy="426699"/>
+                <a:off x="-1144685" y="1909296"/>
+                <a:ext cx="266718" cy="426691"/>
               </a:xfrm>
               <a:prstGeom prst="curvedConnector4">
                 <a:avLst>
                   <a:gd name="adj1" fmla="val -85709"/>
-                  <a:gd name="adj2" fmla="val 75245"/>
+                  <a:gd name="adj2" fmla="val 75246"/>
                 </a:avLst>
               </a:prstGeom>
               <a:ln>
@@ -3495,7 +3495,7 @@
             <p:spPr>
               <a:xfrm>
                 <a:off x="-1144685" y="2120542"/>
-                <a:ext cx="1343025" cy="430887"/>
+                <a:ext cx="1497958" cy="430887"/>
               </a:xfrm>
               <a:prstGeom prst="rect">
                 <a:avLst/>
@@ -3518,7 +3518,7 @@
                     <a:ea typeface="Cambria" panose="02040503050406030204" pitchFamily="18" charset="0"/>
                     <a:cs typeface="Segoe UI Semibold" panose="020B0702040204020203" pitchFamily="34" charset="0"/>
                   </a:rPr>
-                  <a:t>Text decorations for matching text</a:t>
+                  <a:t>Text decorations for the matching text</a:t>
                 </a:r>
               </a:p>
             </p:txBody>
@@ -3585,10 +3585,10 @@
           </p:nvGrpSpPr>
           <p:grpSpPr>
             <a:xfrm>
-              <a:off x="3472994" y="2765343"/>
-              <a:ext cx="1984832" cy="794345"/>
-              <a:chOff x="-1403358" y="1711802"/>
-              <a:chExt cx="1984832" cy="794345"/>
+              <a:off x="3473002" y="2765343"/>
+              <a:ext cx="1770263" cy="794345"/>
+              <a:chOff x="-1403350" y="1711802"/>
+              <a:chExt cx="1770263" cy="794345"/>
             </a:xfrm>
           </p:grpSpPr>
           <p:cxnSp>
@@ -3608,8 +3608,8 @@
             </p:nvCxnSpPr>
             <p:spPr>
               <a:xfrm rot="10800000">
-                <a:off x="-1024560" y="1711802"/>
-                <a:ext cx="249111" cy="578903"/>
+                <a:off x="-1024552" y="1711810"/>
+                <a:ext cx="249103" cy="578895"/>
               </a:xfrm>
               <a:prstGeom prst="curvedConnector2">
                 <a:avLst/>
@@ -3651,7 +3651,7 @@
             <p:spPr>
               <a:xfrm>
                 <a:off x="-775450" y="2075260"/>
-                <a:ext cx="1356924" cy="430887"/>
+                <a:ext cx="1142363" cy="430887"/>
               </a:xfrm>
               <a:prstGeom prst="rect">
                 <a:avLst/>
@@ -3674,7 +3674,7 @@
                     <a:ea typeface="Cambria" panose="02040503050406030204" pitchFamily="18" charset="0"/>
                     <a:cs typeface="Segoe UI Semibold" panose="020B0702040204020203" pitchFamily="34" charset="0"/>
                   </a:rPr>
-                  <a:t>Regex patterns for text selection</a:t>
+                  <a:t>Regex patterns to select text</a:t>
                 </a:r>
               </a:p>
             </p:txBody>
@@ -3696,8 +3696,8 @@
             </p:nvCxnSpPr>
             <p:spPr>
               <a:xfrm rot="10800000">
-                <a:off x="-1403358" y="1711802"/>
-                <a:ext cx="627909" cy="578902"/>
+                <a:off x="-1403350" y="1711802"/>
+                <a:ext cx="627901" cy="578902"/>
               </a:xfrm>
               <a:prstGeom prst="curvedConnector3">
                 <a:avLst>

</xml_diff>